<commit_message>
logo3 + example images for mock up
</commit_message>
<xml_diff>
--- a/business values/Presentation_aris_part1.pptx
+++ b/business values/Presentation_aris_part1.pptx
@@ -5,17 +5,20 @@
     <p:sldMasterId id="2147483648" r:id="rId1"/>
   </p:sldMasterIdLst>
   <p:notesMasterIdLst>
-    <p:notesMasterId r:id="rId10"/>
+    <p:notesMasterId r:id="rId13"/>
   </p:notesMasterIdLst>
   <p:sldIdLst>
     <p:sldId id="262" r:id="rId2"/>
     <p:sldId id="256" r:id="rId3"/>
     <p:sldId id="260" r:id="rId4"/>
     <p:sldId id="263" r:id="rId5"/>
-    <p:sldId id="259" r:id="rId6"/>
-    <p:sldId id="261" r:id="rId7"/>
-    <p:sldId id="257" r:id="rId8"/>
-    <p:sldId id="264" r:id="rId9"/>
+    <p:sldId id="265" r:id="rId6"/>
+    <p:sldId id="259" r:id="rId7"/>
+    <p:sldId id="261" r:id="rId8"/>
+    <p:sldId id="266" r:id="rId9"/>
+    <p:sldId id="267" r:id="rId10"/>
+    <p:sldId id="257" r:id="rId11"/>
+    <p:sldId id="264" r:id="rId12"/>
   </p:sldIdLst>
   <p:sldSz cx="12192000" cy="6858000"/>
   <p:notesSz cx="6858000" cy="9144000"/>
@@ -708,7 +711,7 @@
     </p:spTree>
     <p:extLst>
       <p:ext uri="{BB962C8B-B14F-4D97-AF65-F5344CB8AC3E}">
-        <p14:creationId xmlns:p14="http://schemas.microsoft.com/office/powerpoint/2010/main" val="354320834"/>
+        <p14:creationId xmlns:p14="http://schemas.microsoft.com/office/powerpoint/2010/main" val="2870521442"/>
       </p:ext>
     </p:extLst>
   </p:cSld>
@@ -792,7 +795,259 @@
     </p:spTree>
     <p:extLst>
       <p:ext uri="{BB962C8B-B14F-4D97-AF65-F5344CB8AC3E}">
+        <p14:creationId xmlns:p14="http://schemas.microsoft.com/office/powerpoint/2010/main" val="354320834"/>
+      </p:ext>
+    </p:extLst>
+  </p:cSld>
+  <p:clrMapOvr>
+    <a:masterClrMapping/>
+  </p:clrMapOvr>
+</p:notes>
+</file>
+
+<file path=ppt/notesSlides/notesSlide5.xml><?xml version="1.0" encoding="utf-8"?>
+<p:notes xmlns:a="http://schemas.openxmlformats.org/drawingml/2006/main" xmlns:r="http://schemas.openxmlformats.org/officeDocument/2006/relationships" xmlns:p="http://schemas.openxmlformats.org/presentationml/2006/main">
+  <p:cSld>
+    <p:spTree>
+      <p:nvGrpSpPr>
+        <p:cNvPr id="1" name=""/>
+        <p:cNvGrpSpPr/>
+        <p:nvPr/>
+      </p:nvGrpSpPr>
+      <p:grpSpPr>
+        <a:xfrm>
+          <a:off x="0" y="0"/>
+          <a:ext cx="0" cy="0"/>
+          <a:chOff x="0" y="0"/>
+          <a:chExt cx="0" cy="0"/>
+        </a:xfrm>
+      </p:grpSpPr>
+      <p:sp>
+        <p:nvSpPr>
+          <p:cNvPr id="2" name="Folienbildplatzhalter 1"/>
+          <p:cNvSpPr>
+            <a:spLocks noGrp="1" noRot="1" noChangeAspect="1"/>
+          </p:cNvSpPr>
+          <p:nvPr>
+            <p:ph type="sldImg"/>
+          </p:nvPr>
+        </p:nvSpPr>
+        <p:spPr/>
+      </p:sp>
+      <p:sp>
+        <p:nvSpPr>
+          <p:cNvPr id="3" name="Notizenplatzhalter 2"/>
+          <p:cNvSpPr>
+            <a:spLocks noGrp="1"/>
+          </p:cNvSpPr>
+          <p:nvPr>
+            <p:ph type="body" idx="1"/>
+          </p:nvPr>
+        </p:nvSpPr>
+        <p:spPr/>
+        <p:txBody>
+          <a:bodyPr/>
+          <a:lstStyle/>
+          <a:p>
+            <a:endParaRPr lang="de-DE" dirty="0"/>
+          </a:p>
+        </p:txBody>
+      </p:sp>
+      <p:sp>
+        <p:nvSpPr>
+          <p:cNvPr id="4" name="Foliennummernplatzhalter 3"/>
+          <p:cNvSpPr>
+            <a:spLocks noGrp="1"/>
+          </p:cNvSpPr>
+          <p:nvPr>
+            <p:ph type="sldNum" sz="quarter" idx="5"/>
+          </p:nvPr>
+        </p:nvSpPr>
+        <p:spPr/>
+        <p:txBody>
+          <a:bodyPr/>
+          <a:lstStyle/>
+          <a:p>
+            <a:fld id="{F42E209C-F244-0A4D-B686-9A345E362A9E}" type="slidenum">
+              <a:rPr lang="de-DE" smtClean="0"/>
+              <a:t>7</a:t>
+            </a:fld>
+            <a:endParaRPr lang="de-DE" dirty="0"/>
+          </a:p>
+        </p:txBody>
+      </p:sp>
+    </p:spTree>
+    <p:extLst>
+      <p:ext uri="{BB962C8B-B14F-4D97-AF65-F5344CB8AC3E}">
         <p14:creationId xmlns:p14="http://schemas.microsoft.com/office/powerpoint/2010/main" val="4198912483"/>
+      </p:ext>
+    </p:extLst>
+  </p:cSld>
+  <p:clrMapOvr>
+    <a:masterClrMapping/>
+  </p:clrMapOvr>
+</p:notes>
+</file>
+
+<file path=ppt/notesSlides/notesSlide6.xml><?xml version="1.0" encoding="utf-8"?>
+<p:notes xmlns:a="http://schemas.openxmlformats.org/drawingml/2006/main" xmlns:r="http://schemas.openxmlformats.org/officeDocument/2006/relationships" xmlns:p="http://schemas.openxmlformats.org/presentationml/2006/main">
+  <p:cSld>
+    <p:spTree>
+      <p:nvGrpSpPr>
+        <p:cNvPr id="1" name=""/>
+        <p:cNvGrpSpPr/>
+        <p:nvPr/>
+      </p:nvGrpSpPr>
+      <p:grpSpPr>
+        <a:xfrm>
+          <a:off x="0" y="0"/>
+          <a:ext cx="0" cy="0"/>
+          <a:chOff x="0" y="0"/>
+          <a:chExt cx="0" cy="0"/>
+        </a:xfrm>
+      </p:grpSpPr>
+      <p:sp>
+        <p:nvSpPr>
+          <p:cNvPr id="2" name="Folienbildplatzhalter 1"/>
+          <p:cNvSpPr>
+            <a:spLocks noGrp="1" noRot="1" noChangeAspect="1"/>
+          </p:cNvSpPr>
+          <p:nvPr>
+            <p:ph type="sldImg"/>
+          </p:nvPr>
+        </p:nvSpPr>
+        <p:spPr/>
+      </p:sp>
+      <p:sp>
+        <p:nvSpPr>
+          <p:cNvPr id="3" name="Notizenplatzhalter 2"/>
+          <p:cNvSpPr>
+            <a:spLocks noGrp="1"/>
+          </p:cNvSpPr>
+          <p:nvPr>
+            <p:ph type="body" idx="1"/>
+          </p:nvPr>
+        </p:nvSpPr>
+        <p:spPr/>
+        <p:txBody>
+          <a:bodyPr/>
+          <a:lstStyle/>
+          <a:p>
+            <a:endParaRPr lang="de-DE" dirty="0"/>
+          </a:p>
+        </p:txBody>
+      </p:sp>
+      <p:sp>
+        <p:nvSpPr>
+          <p:cNvPr id="4" name="Foliennummernplatzhalter 3"/>
+          <p:cNvSpPr>
+            <a:spLocks noGrp="1"/>
+          </p:cNvSpPr>
+          <p:nvPr>
+            <p:ph type="sldNum" sz="quarter" idx="5"/>
+          </p:nvPr>
+        </p:nvSpPr>
+        <p:spPr/>
+        <p:txBody>
+          <a:bodyPr/>
+          <a:lstStyle/>
+          <a:p>
+            <a:fld id="{F42E209C-F244-0A4D-B686-9A345E362A9E}" type="slidenum">
+              <a:rPr lang="de-DE" smtClean="0"/>
+              <a:t>8</a:t>
+            </a:fld>
+            <a:endParaRPr lang="de-DE" dirty="0"/>
+          </a:p>
+        </p:txBody>
+      </p:sp>
+    </p:spTree>
+    <p:extLst>
+      <p:ext uri="{BB962C8B-B14F-4D97-AF65-F5344CB8AC3E}">
+        <p14:creationId xmlns:p14="http://schemas.microsoft.com/office/powerpoint/2010/main" val="931988565"/>
+      </p:ext>
+    </p:extLst>
+  </p:cSld>
+  <p:clrMapOvr>
+    <a:masterClrMapping/>
+  </p:clrMapOvr>
+</p:notes>
+</file>
+
+<file path=ppt/notesSlides/notesSlide7.xml><?xml version="1.0" encoding="utf-8"?>
+<p:notes xmlns:a="http://schemas.openxmlformats.org/drawingml/2006/main" xmlns:r="http://schemas.openxmlformats.org/officeDocument/2006/relationships" xmlns:p="http://schemas.openxmlformats.org/presentationml/2006/main">
+  <p:cSld>
+    <p:spTree>
+      <p:nvGrpSpPr>
+        <p:cNvPr id="1" name=""/>
+        <p:cNvGrpSpPr/>
+        <p:nvPr/>
+      </p:nvGrpSpPr>
+      <p:grpSpPr>
+        <a:xfrm>
+          <a:off x="0" y="0"/>
+          <a:ext cx="0" cy="0"/>
+          <a:chOff x="0" y="0"/>
+          <a:chExt cx="0" cy="0"/>
+        </a:xfrm>
+      </p:grpSpPr>
+      <p:sp>
+        <p:nvSpPr>
+          <p:cNvPr id="2" name="Folienbildplatzhalter 1"/>
+          <p:cNvSpPr>
+            <a:spLocks noGrp="1" noRot="1" noChangeAspect="1"/>
+          </p:cNvSpPr>
+          <p:nvPr>
+            <p:ph type="sldImg"/>
+          </p:nvPr>
+        </p:nvSpPr>
+        <p:spPr/>
+      </p:sp>
+      <p:sp>
+        <p:nvSpPr>
+          <p:cNvPr id="3" name="Notizenplatzhalter 2"/>
+          <p:cNvSpPr>
+            <a:spLocks noGrp="1"/>
+          </p:cNvSpPr>
+          <p:nvPr>
+            <p:ph type="body" idx="1"/>
+          </p:nvPr>
+        </p:nvSpPr>
+        <p:spPr/>
+        <p:txBody>
+          <a:bodyPr/>
+          <a:lstStyle/>
+          <a:p>
+            <a:endParaRPr lang="de-DE" dirty="0"/>
+          </a:p>
+        </p:txBody>
+      </p:sp>
+      <p:sp>
+        <p:nvSpPr>
+          <p:cNvPr id="4" name="Foliennummernplatzhalter 3"/>
+          <p:cNvSpPr>
+            <a:spLocks noGrp="1"/>
+          </p:cNvSpPr>
+          <p:nvPr>
+            <p:ph type="sldNum" sz="quarter" idx="5"/>
+          </p:nvPr>
+        </p:nvSpPr>
+        <p:spPr/>
+        <p:txBody>
+          <a:bodyPr/>
+          <a:lstStyle/>
+          <a:p>
+            <a:fld id="{F42E209C-F244-0A4D-B686-9A345E362A9E}" type="slidenum">
+              <a:rPr lang="de-DE" smtClean="0"/>
+              <a:t>9</a:t>
+            </a:fld>
+            <a:endParaRPr lang="de-DE" dirty="0"/>
+          </a:p>
+        </p:txBody>
+      </p:sp>
+    </p:spTree>
+    <p:extLst>
+      <p:ext uri="{BB962C8B-B14F-4D97-AF65-F5344CB8AC3E}">
+        <p14:creationId xmlns:p14="http://schemas.microsoft.com/office/powerpoint/2010/main" val="524359911"/>
       </p:ext>
     </p:extLst>
   </p:cSld>
@@ -4108,647 +4363,7 @@
 </p:sld>
 </file>
 
-<file path=ppt/slides/slide2.xml><?xml version="1.0" encoding="utf-8"?>
-<p:sld xmlns:a="http://schemas.openxmlformats.org/drawingml/2006/main" xmlns:r="http://schemas.openxmlformats.org/officeDocument/2006/relationships" xmlns:p="http://schemas.openxmlformats.org/presentationml/2006/main">
-  <p:cSld>
-    <p:spTree>
-      <p:nvGrpSpPr>
-        <p:cNvPr id="1" name=""/>
-        <p:cNvGrpSpPr/>
-        <p:nvPr/>
-      </p:nvGrpSpPr>
-      <p:grpSpPr>
-        <a:xfrm>
-          <a:off x="0" y="0"/>
-          <a:ext cx="0" cy="0"/>
-          <a:chOff x="0" y="0"/>
-          <a:chExt cx="0" cy="0"/>
-        </a:xfrm>
-      </p:grpSpPr>
-      <p:sp>
-        <p:nvSpPr>
-          <p:cNvPr id="2" name="Titel 1">
-            <a:extLst>
-              <a:ext uri="{FF2B5EF4-FFF2-40B4-BE49-F238E27FC236}">
-                <a16:creationId xmlns:a16="http://schemas.microsoft.com/office/drawing/2014/main" id="{90258236-5858-64A2-6F1D-648EA7886F22}"/>
-              </a:ext>
-            </a:extLst>
-          </p:cNvPr>
-          <p:cNvSpPr>
-            <a:spLocks noGrp="1"/>
-          </p:cNvSpPr>
-          <p:nvPr>
-            <p:ph type="ctrTitle"/>
-          </p:nvPr>
-        </p:nvSpPr>
-        <p:spPr>
-          <a:xfrm>
-            <a:off x="0" y="0"/>
-            <a:ext cx="12191999" cy="6858000"/>
-          </a:xfrm>
-          <a:solidFill>
-            <a:srgbClr val="0E0047"/>
-          </a:solidFill>
-          <a:ln w="57150">
-            <a:solidFill>
-              <a:srgbClr val="FF0000"/>
-            </a:solidFill>
-          </a:ln>
-        </p:spPr>
-        <p:txBody>
-          <a:bodyPr>
-            <a:normAutofit/>
-          </a:bodyPr>
-          <a:lstStyle/>
-          <a:p>
-            <a:r>
-              <a:rPr lang="de-DE" sz="18000" b="1" dirty="0">
-                <a:solidFill>
-                  <a:srgbClr val="FF0000"/>
-                </a:solidFill>
-                <a:latin typeface="Biome" panose="020B0604020202020204" pitchFamily="34" charset="0"/>
-                <a:cs typeface="Biome" panose="020B0604020202020204" pitchFamily="34" charset="0"/>
-              </a:rPr>
-              <a:t>POSE FIX</a:t>
-            </a:r>
-          </a:p>
-        </p:txBody>
-      </p:sp>
-      <p:pic>
-        <p:nvPicPr>
-          <p:cNvPr id="7" name="Grafik 6" descr="Ein Bild, das Karminrot, Silhouette enthält.&#10;&#10;Automatisch generierte Beschreibung">
-            <a:extLst>
-              <a:ext uri="{FF2B5EF4-FFF2-40B4-BE49-F238E27FC236}">
-                <a16:creationId xmlns:a16="http://schemas.microsoft.com/office/drawing/2014/main" id="{1E93E022-8F9B-47F5-C757-E0A83A088892}"/>
-              </a:ext>
-            </a:extLst>
-          </p:cNvPr>
-          <p:cNvPicPr>
-            <a:picLocks noChangeAspect="1"/>
-          </p:cNvPicPr>
-          <p:nvPr/>
-        </p:nvPicPr>
-        <p:blipFill>
-          <a:blip r:embed="rId2"/>
-          <a:stretch>
-            <a:fillRect/>
-          </a:stretch>
-        </p:blipFill>
-        <p:spPr>
-          <a:xfrm>
-            <a:off x="3588325" y="651162"/>
-            <a:ext cx="6858000" cy="6858000"/>
-          </a:xfrm>
-          <a:prstGeom prst="rect">
-            <a:avLst/>
-          </a:prstGeom>
-        </p:spPr>
-      </p:pic>
-    </p:spTree>
-    <p:extLst>
-      <p:ext uri="{BB962C8B-B14F-4D97-AF65-F5344CB8AC3E}">
-        <p14:creationId xmlns:p14="http://schemas.microsoft.com/office/powerpoint/2010/main" val="2124784099"/>
-      </p:ext>
-    </p:extLst>
-  </p:cSld>
-  <p:clrMapOvr>
-    <a:masterClrMapping/>
-  </p:clrMapOvr>
-</p:sld>
-</file>
-
-<file path=ppt/slides/slide3.xml><?xml version="1.0" encoding="utf-8"?>
-<p:sld xmlns:a="http://schemas.openxmlformats.org/drawingml/2006/main" xmlns:r="http://schemas.openxmlformats.org/officeDocument/2006/relationships" xmlns:p="http://schemas.openxmlformats.org/presentationml/2006/main">
-  <p:cSld>
-    <p:spTree>
-      <p:nvGrpSpPr>
-        <p:cNvPr id="1" name=""/>
-        <p:cNvGrpSpPr/>
-        <p:nvPr/>
-      </p:nvGrpSpPr>
-      <p:grpSpPr>
-        <a:xfrm>
-          <a:off x="0" y="0"/>
-          <a:ext cx="0" cy="0"/>
-          <a:chOff x="0" y="0"/>
-          <a:chExt cx="0" cy="0"/>
-        </a:xfrm>
-      </p:grpSpPr>
-      <p:sp>
-        <p:nvSpPr>
-          <p:cNvPr id="2" name="Titel 1">
-            <a:extLst>
-              <a:ext uri="{FF2B5EF4-FFF2-40B4-BE49-F238E27FC236}">
-                <a16:creationId xmlns:a16="http://schemas.microsoft.com/office/drawing/2014/main" id="{90258236-5858-64A2-6F1D-648EA7886F22}"/>
-              </a:ext>
-            </a:extLst>
-          </p:cNvPr>
-          <p:cNvSpPr>
-            <a:spLocks noGrp="1"/>
-          </p:cNvSpPr>
-          <p:nvPr>
-            <p:ph type="ctrTitle"/>
-          </p:nvPr>
-        </p:nvSpPr>
-        <p:spPr>
-          <a:xfrm>
-            <a:off x="0" y="0"/>
-            <a:ext cx="12191999" cy="6858000"/>
-          </a:xfrm>
-          <a:noFill/>
-          <a:ln w="104775">
-            <a:noFill/>
-          </a:ln>
-        </p:spPr>
-        <p:txBody>
-          <a:bodyPr>
-            <a:normAutofit/>
-          </a:bodyPr>
-          <a:lstStyle/>
-          <a:p>
-            <a:r>
-              <a:rPr lang="de-DE" sz="18000" b="1" dirty="0">
-                <a:solidFill>
-                  <a:srgbClr val="FF0000"/>
-                </a:solidFill>
-                <a:latin typeface="Biome" panose="020B0604020202020204" pitchFamily="34" charset="0"/>
-                <a:cs typeface="Biome" panose="020B0604020202020204" pitchFamily="34" charset="0"/>
-              </a:rPr>
-              <a:t>POSEFIX</a:t>
-            </a:r>
-            <a:r>
-              <a:rPr lang="de-DE" sz="18000" b="1" dirty="0">
-                <a:solidFill>
-                  <a:schemeClr val="bg1"/>
-                </a:solidFill>
-                <a:latin typeface="Biome" panose="020B0604020202020204" pitchFamily="34" charset="0"/>
-                <a:cs typeface="Biome" panose="020B0604020202020204" pitchFamily="34" charset="0"/>
-              </a:rPr>
-              <a:t>I</a:t>
-            </a:r>
-          </a:p>
-        </p:txBody>
-      </p:sp>
-      <p:pic>
-        <p:nvPicPr>
-          <p:cNvPr id="7" name="Grafik 6" descr="Ein Bild, das Karminrot, Silhouette enthält.&#10;&#10;Automatisch generierte Beschreibung">
-            <a:extLst>
-              <a:ext uri="{FF2B5EF4-FFF2-40B4-BE49-F238E27FC236}">
-                <a16:creationId xmlns:a16="http://schemas.microsoft.com/office/drawing/2014/main" id="{1E93E022-8F9B-47F5-C757-E0A83A088892}"/>
-              </a:ext>
-            </a:extLst>
-          </p:cNvPr>
-          <p:cNvPicPr>
-            <a:picLocks noChangeAspect="1"/>
-          </p:cNvPicPr>
-          <p:nvPr/>
-        </p:nvPicPr>
-        <p:blipFill>
-          <a:blip r:embed="rId3"/>
-          <a:stretch>
-            <a:fillRect/>
-          </a:stretch>
-        </p:blipFill>
-        <p:spPr>
-          <a:xfrm>
-            <a:off x="7148944" y="623453"/>
-            <a:ext cx="6858000" cy="6858000"/>
-          </a:xfrm>
-          <a:prstGeom prst="rect">
-            <a:avLst/>
-          </a:prstGeom>
-        </p:spPr>
-      </p:pic>
-    </p:spTree>
-    <p:extLst>
-      <p:ext uri="{BB962C8B-B14F-4D97-AF65-F5344CB8AC3E}">
-        <p14:creationId xmlns:p14="http://schemas.microsoft.com/office/powerpoint/2010/main" val="1380562448"/>
-      </p:ext>
-    </p:extLst>
-  </p:cSld>
-  <p:clrMapOvr>
-    <a:masterClrMapping/>
-  </p:clrMapOvr>
-</p:sld>
-</file>
-
-<file path=ppt/slides/slide4.xml><?xml version="1.0" encoding="utf-8"?>
-<p:sld xmlns:a="http://schemas.openxmlformats.org/drawingml/2006/main" xmlns:r="http://schemas.openxmlformats.org/officeDocument/2006/relationships" xmlns:p="http://schemas.openxmlformats.org/presentationml/2006/main">
-  <p:cSld>
-    <p:spTree>
-      <p:nvGrpSpPr>
-        <p:cNvPr id="1" name=""/>
-        <p:cNvGrpSpPr/>
-        <p:nvPr/>
-      </p:nvGrpSpPr>
-      <p:grpSpPr>
-        <a:xfrm>
-          <a:off x="0" y="0"/>
-          <a:ext cx="0" cy="0"/>
-          <a:chOff x="0" y="0"/>
-          <a:chExt cx="0" cy="0"/>
-        </a:xfrm>
-      </p:grpSpPr>
-      <p:sp>
-        <p:nvSpPr>
-          <p:cNvPr id="3" name="Titel 1">
-            <a:extLst>
-              <a:ext uri="{FF2B5EF4-FFF2-40B4-BE49-F238E27FC236}">
-                <a16:creationId xmlns:a16="http://schemas.microsoft.com/office/drawing/2014/main" id="{F4110FD1-95D2-75CD-1D51-5AAAB6CE2545}"/>
-              </a:ext>
-            </a:extLst>
-          </p:cNvPr>
-          <p:cNvSpPr txBox="1">
-            <a:spLocks/>
-          </p:cNvSpPr>
-          <p:nvPr/>
-        </p:nvSpPr>
-        <p:spPr>
-          <a:xfrm>
-            <a:off x="4" y="0"/>
-            <a:ext cx="12191999" cy="6858000"/>
-          </a:xfrm>
-          <a:prstGeom prst="rect">
-            <a:avLst/>
-          </a:prstGeom>
-          <a:solidFill>
-            <a:srgbClr val="0E0047"/>
-          </a:solidFill>
-          <a:ln w="104775">
-            <a:solidFill>
-              <a:srgbClr val="FF0000"/>
-            </a:solidFill>
-          </a:ln>
-        </p:spPr>
-        <p:txBody>
-          <a:bodyPr vert="horz" lIns="91440" tIns="45720" rIns="91440" bIns="45720" rtlCol="0" anchor="b">
-            <a:normAutofit/>
-          </a:bodyPr>
-          <a:lstStyle>
-            <a:lvl1pPr algn="ctr" defTabSz="914400" rtl="0" eaLnBrk="1" latinLnBrk="0" hangingPunct="1">
-              <a:lnSpc>
-                <a:spcPct val="90000"/>
-              </a:lnSpc>
-              <a:spcBef>
-                <a:spcPct val="0"/>
-              </a:spcBef>
-              <a:buNone/>
-              <a:defRPr sz="6000" kern="1200">
-                <a:solidFill>
-                  <a:schemeClr val="tx1"/>
-                </a:solidFill>
-                <a:latin typeface="+mj-lt"/>
-                <a:ea typeface="+mj-ea"/>
-                <a:cs typeface="+mj-cs"/>
-              </a:defRPr>
-            </a:lvl1pPr>
-          </a:lstStyle>
-          <a:p>
-            <a:r>
-              <a:rPr lang="de-DE" sz="18000" b="1" dirty="0">
-                <a:solidFill>
-                  <a:srgbClr val="FF0000"/>
-                </a:solidFill>
-                <a:latin typeface="Biome" panose="020B0604020202020204" pitchFamily="34" charset="0"/>
-                <a:cs typeface="Biome" panose="020B0604020202020204" pitchFamily="34" charset="0"/>
-              </a:rPr>
-              <a:t>POSEFIX</a:t>
-            </a:r>
-          </a:p>
-        </p:txBody>
-      </p:sp>
-      <p:sp>
-        <p:nvSpPr>
-          <p:cNvPr id="2" name="Titel 1">
-            <a:extLst>
-              <a:ext uri="{FF2B5EF4-FFF2-40B4-BE49-F238E27FC236}">
-                <a16:creationId xmlns:a16="http://schemas.microsoft.com/office/drawing/2014/main" id="{90258236-5858-64A2-6F1D-648EA7886F22}"/>
-              </a:ext>
-            </a:extLst>
-          </p:cNvPr>
-          <p:cNvSpPr>
-            <a:spLocks noGrp="1"/>
-          </p:cNvSpPr>
-          <p:nvPr>
-            <p:ph type="ctrTitle"/>
-          </p:nvPr>
-        </p:nvSpPr>
-        <p:spPr>
-          <a:xfrm>
-            <a:off x="0" y="0"/>
-            <a:ext cx="12191999" cy="6858000"/>
-          </a:xfrm>
-          <a:solidFill>
-            <a:schemeClr val="bg1"/>
-          </a:solidFill>
-          <a:ln w="104775">
-            <a:noFill/>
-          </a:ln>
-        </p:spPr>
-        <p:txBody>
-          <a:bodyPr>
-            <a:normAutofit/>
-          </a:bodyPr>
-          <a:lstStyle/>
-          <a:p>
-            <a:r>
-              <a:rPr lang="de-DE" sz="18000" b="1" dirty="0">
-                <a:solidFill>
-                  <a:srgbClr val="FF0000"/>
-                </a:solidFill>
-                <a:latin typeface="Biome" panose="020B0604020202020204" pitchFamily="34" charset="0"/>
-                <a:cs typeface="Biome" panose="020B0604020202020204" pitchFamily="34" charset="0"/>
-              </a:rPr>
-              <a:t>POSEFIX</a:t>
-            </a:r>
-            <a:r>
-              <a:rPr lang="de-DE" sz="18000" b="1" dirty="0">
-                <a:solidFill>
-                  <a:schemeClr val="bg1"/>
-                </a:solidFill>
-                <a:latin typeface="Biome" panose="020B0604020202020204" pitchFamily="34" charset="0"/>
-                <a:cs typeface="Biome" panose="020B0604020202020204" pitchFamily="34" charset="0"/>
-              </a:rPr>
-              <a:t>I</a:t>
-            </a:r>
-          </a:p>
-        </p:txBody>
-      </p:sp>
-      <p:pic>
-        <p:nvPicPr>
-          <p:cNvPr id="7" name="Grafik 6" descr="Ein Bild, das Karminrot, Silhouette enthält.&#10;&#10;Automatisch generierte Beschreibung">
-            <a:extLst>
-              <a:ext uri="{FF2B5EF4-FFF2-40B4-BE49-F238E27FC236}">
-                <a16:creationId xmlns:a16="http://schemas.microsoft.com/office/drawing/2014/main" id="{1E93E022-8F9B-47F5-C757-E0A83A088892}"/>
-              </a:ext>
-            </a:extLst>
-          </p:cNvPr>
-          <p:cNvPicPr>
-            <a:picLocks noChangeAspect="1"/>
-          </p:cNvPicPr>
-          <p:nvPr/>
-        </p:nvPicPr>
-        <p:blipFill>
-          <a:blip r:embed="rId3"/>
-          <a:stretch>
-            <a:fillRect/>
-          </a:stretch>
-        </p:blipFill>
-        <p:spPr>
-          <a:xfrm>
-            <a:off x="7148944" y="623453"/>
-            <a:ext cx="6858000" cy="6858000"/>
-          </a:xfrm>
-          <a:prstGeom prst="rect">
-            <a:avLst/>
-          </a:prstGeom>
-        </p:spPr>
-      </p:pic>
-    </p:spTree>
-    <p:extLst>
-      <p:ext uri="{BB962C8B-B14F-4D97-AF65-F5344CB8AC3E}">
-        <p14:creationId xmlns:p14="http://schemas.microsoft.com/office/powerpoint/2010/main" val="3461760285"/>
-      </p:ext>
-    </p:extLst>
-  </p:cSld>
-  <p:clrMapOvr>
-    <a:masterClrMapping/>
-  </p:clrMapOvr>
-</p:sld>
-</file>
-
-<file path=ppt/slides/slide5.xml><?xml version="1.0" encoding="utf-8"?>
-<p:sld xmlns:a="http://schemas.openxmlformats.org/drawingml/2006/main" xmlns:r="http://schemas.openxmlformats.org/officeDocument/2006/relationships" xmlns:p="http://schemas.openxmlformats.org/presentationml/2006/main" showMasterSp="0">
-  <p:cSld>
-    <p:spTree>
-      <p:nvGrpSpPr>
-        <p:cNvPr id="1" name=""/>
-        <p:cNvGrpSpPr/>
-        <p:nvPr/>
-      </p:nvGrpSpPr>
-      <p:grpSpPr>
-        <a:xfrm>
-          <a:off x="0" y="0"/>
-          <a:ext cx="0" cy="0"/>
-          <a:chOff x="0" y="0"/>
-          <a:chExt cx="0" cy="0"/>
-        </a:xfrm>
-      </p:grpSpPr>
-      <p:sp>
-        <p:nvSpPr>
-          <p:cNvPr id="2" name="Titel 1">
-            <a:extLst>
-              <a:ext uri="{FF2B5EF4-FFF2-40B4-BE49-F238E27FC236}">
-                <a16:creationId xmlns:a16="http://schemas.microsoft.com/office/drawing/2014/main" id="{90258236-5858-64A2-6F1D-648EA7886F22}"/>
-              </a:ext>
-            </a:extLst>
-          </p:cNvPr>
-          <p:cNvSpPr>
-            <a:spLocks noGrp="1"/>
-          </p:cNvSpPr>
-          <p:nvPr>
-            <p:ph type="ctrTitle"/>
-          </p:nvPr>
-        </p:nvSpPr>
-        <p:spPr>
-          <a:xfrm>
-            <a:off x="0" y="0"/>
-            <a:ext cx="12191999" cy="6858000"/>
-          </a:xfrm>
-          <a:solidFill>
-            <a:schemeClr val="bg1"/>
-          </a:solidFill>
-          <a:ln w="57150">
-            <a:solidFill>
-              <a:srgbClr val="FF0000"/>
-            </a:solidFill>
-          </a:ln>
-        </p:spPr>
-        <p:txBody>
-          <a:bodyPr anchor="ctr">
-            <a:normAutofit/>
-          </a:bodyPr>
-          <a:lstStyle/>
-          <a:p>
-            <a:r>
-              <a:rPr lang="de-DE" sz="17000" b="1" dirty="0">
-                <a:solidFill>
-                  <a:srgbClr val="FF0000"/>
-                </a:solidFill>
-                <a:latin typeface="Biome" panose="020B0604020202020204" pitchFamily="34" charset="0"/>
-                <a:cs typeface="Biome" panose="020B0604020202020204" pitchFamily="34" charset="0"/>
-              </a:rPr>
-              <a:t>POSEFIX</a:t>
-            </a:r>
-            <a:endParaRPr lang="de-DE" sz="18000" b="1" dirty="0">
-              <a:solidFill>
-                <a:srgbClr val="FF0000"/>
-              </a:solidFill>
-              <a:latin typeface="Biome" panose="020B0604020202020204" pitchFamily="34" charset="0"/>
-              <a:cs typeface="Biome" panose="020B0604020202020204" pitchFamily="34" charset="0"/>
-            </a:endParaRPr>
-          </a:p>
-        </p:txBody>
-      </p:sp>
-      <p:pic>
-        <p:nvPicPr>
-          <p:cNvPr id="4" name="Grafik 3" descr="Ein Bild, das Stuhl, Design, Mobiliar enthält.&#10;&#10;Automatisch generierte Beschreibung">
-            <a:extLst>
-              <a:ext uri="{FF2B5EF4-FFF2-40B4-BE49-F238E27FC236}">
-                <a16:creationId xmlns:a16="http://schemas.microsoft.com/office/drawing/2014/main" id="{EB43AE25-30B9-89EA-895F-2E6CEE4FEDBC}"/>
-              </a:ext>
-            </a:extLst>
-          </p:cNvPr>
-          <p:cNvPicPr>
-            <a:picLocks noChangeAspect="1"/>
-          </p:cNvPicPr>
-          <p:nvPr/>
-        </p:nvPicPr>
-        <p:blipFill>
-          <a:blip r:embed="rId3"/>
-          <a:stretch>
-            <a:fillRect/>
-          </a:stretch>
-        </p:blipFill>
-        <p:spPr>
-          <a:xfrm>
-            <a:off x="167431" y="2637857"/>
-            <a:ext cx="2392796" cy="3593422"/>
-          </a:xfrm>
-          <a:prstGeom prst="rect">
-            <a:avLst/>
-          </a:prstGeom>
-        </p:spPr>
-      </p:pic>
-    </p:spTree>
-    <p:extLst>
-      <p:ext uri="{BB962C8B-B14F-4D97-AF65-F5344CB8AC3E}">
-        <p14:creationId xmlns:p14="http://schemas.microsoft.com/office/powerpoint/2010/main" val="2043243625"/>
-      </p:ext>
-    </p:extLst>
-  </p:cSld>
-  <p:clrMapOvr>
-    <a:masterClrMapping/>
-  </p:clrMapOvr>
-</p:sld>
-</file>
-
-<file path=ppt/slides/slide6.xml><?xml version="1.0" encoding="utf-8"?>
-<p:sld xmlns:a="http://schemas.openxmlformats.org/drawingml/2006/main" xmlns:r="http://schemas.openxmlformats.org/officeDocument/2006/relationships" xmlns:p="http://schemas.openxmlformats.org/presentationml/2006/main">
-  <p:cSld>
-    <p:spTree>
-      <p:nvGrpSpPr>
-        <p:cNvPr id="1" name=""/>
-        <p:cNvGrpSpPr/>
-        <p:nvPr/>
-      </p:nvGrpSpPr>
-      <p:grpSpPr>
-        <a:xfrm>
-          <a:off x="0" y="0"/>
-          <a:ext cx="0" cy="0"/>
-          <a:chOff x="0" y="0"/>
-          <a:chExt cx="0" cy="0"/>
-        </a:xfrm>
-      </p:grpSpPr>
-      <p:sp>
-        <p:nvSpPr>
-          <p:cNvPr id="2" name="Titel 1">
-            <a:extLst>
-              <a:ext uri="{FF2B5EF4-FFF2-40B4-BE49-F238E27FC236}">
-                <a16:creationId xmlns:a16="http://schemas.microsoft.com/office/drawing/2014/main" id="{90258236-5858-64A2-6F1D-648EA7886F22}"/>
-              </a:ext>
-            </a:extLst>
-          </p:cNvPr>
-          <p:cNvSpPr>
-            <a:spLocks noGrp="1"/>
-          </p:cNvSpPr>
-          <p:nvPr>
-            <p:ph type="ctrTitle"/>
-          </p:nvPr>
-        </p:nvSpPr>
-        <p:spPr>
-          <a:xfrm>
-            <a:off x="0" y="0"/>
-            <a:ext cx="12191999" cy="6858000"/>
-          </a:xfrm>
-          <a:solidFill>
-            <a:schemeClr val="bg1"/>
-          </a:solidFill>
-          <a:ln w="104775">
-            <a:noFill/>
-          </a:ln>
-        </p:spPr>
-        <p:txBody>
-          <a:bodyPr anchor="ctr">
-            <a:normAutofit/>
-          </a:bodyPr>
-          <a:lstStyle/>
-          <a:p>
-            <a:pPr algn="l"/>
-            <a:r>
-              <a:rPr lang="de-DE" sz="15000" b="1" dirty="0">
-                <a:solidFill>
-                  <a:srgbClr val="FF0000"/>
-                </a:solidFill>
-                <a:latin typeface="Biome" panose="020B0604020202020204" pitchFamily="34" charset="0"/>
-                <a:cs typeface="Biome" panose="020B0604020202020204" pitchFamily="34" charset="0"/>
-              </a:rPr>
-              <a:t>       POSEFIX</a:t>
-            </a:r>
-            <a:endParaRPr lang="de-DE" sz="18000" b="1" dirty="0">
-              <a:solidFill>
-                <a:srgbClr val="FF0000"/>
-              </a:solidFill>
-              <a:latin typeface="Biome" panose="020B0604020202020204" pitchFamily="34" charset="0"/>
-              <a:cs typeface="Biome" panose="020B0604020202020204" pitchFamily="34" charset="0"/>
-            </a:endParaRPr>
-          </a:p>
-        </p:txBody>
-      </p:sp>
-      <p:pic>
-        <p:nvPicPr>
-          <p:cNvPr id="4" name="Grafik 3" descr="Ein Bild, das Stuhl, Design, Mobiliar enthält.&#10;&#10;Automatisch generierte Beschreibung">
-            <a:extLst>
-              <a:ext uri="{FF2B5EF4-FFF2-40B4-BE49-F238E27FC236}">
-                <a16:creationId xmlns:a16="http://schemas.microsoft.com/office/drawing/2014/main" id="{EB43AE25-30B9-89EA-895F-2E6CEE4FEDBC}"/>
-              </a:ext>
-            </a:extLst>
-          </p:cNvPr>
-          <p:cNvPicPr>
-            <a:picLocks noChangeAspect="1"/>
-          </p:cNvPicPr>
-          <p:nvPr/>
-        </p:nvPicPr>
-        <p:blipFill>
-          <a:blip r:embed="rId3"/>
-          <a:stretch>
-            <a:fillRect/>
-          </a:stretch>
-        </p:blipFill>
-        <p:spPr>
-          <a:xfrm>
-            <a:off x="1050298" y="1187431"/>
-            <a:ext cx="2392796" cy="3593422"/>
-          </a:xfrm>
-          <a:prstGeom prst="rect">
-            <a:avLst/>
-          </a:prstGeom>
-        </p:spPr>
-      </p:pic>
-    </p:spTree>
-    <p:extLst>
-      <p:ext uri="{BB962C8B-B14F-4D97-AF65-F5344CB8AC3E}">
-        <p14:creationId xmlns:p14="http://schemas.microsoft.com/office/powerpoint/2010/main" val="1256475708"/>
-      </p:ext>
-    </p:extLst>
-  </p:cSld>
-  <p:clrMapOvr>
-    <a:masterClrMapping/>
-  </p:clrMapOvr>
-</p:sld>
-</file>
-
-<file path=ppt/slides/slide7.xml><?xml version="1.0" encoding="utf-8"?>
+<file path=ppt/slides/slide10.xml><?xml version="1.0" encoding="utf-8"?>
 <p:sld xmlns:a="http://schemas.openxmlformats.org/drawingml/2006/main" xmlns:r="http://schemas.openxmlformats.org/officeDocument/2006/relationships" xmlns:p="http://schemas.openxmlformats.org/presentationml/2006/main">
   <p:cSld>
     <p:spTree>
@@ -6315,7 +5930,7 @@
 </p:sld>
 </file>
 
-<file path=ppt/slides/slide8.xml><?xml version="1.0" encoding="utf-8"?>
+<file path=ppt/slides/slide11.xml><?xml version="1.0" encoding="utf-8"?>
 <p:sld xmlns:a="http://schemas.openxmlformats.org/drawingml/2006/main" xmlns:r="http://schemas.openxmlformats.org/officeDocument/2006/relationships" xmlns:p="http://schemas.openxmlformats.org/presentationml/2006/main">
   <p:cSld>
     <p:spTree>
@@ -6451,6 +6066,1102 @@
     <p:extLst>
       <p:ext uri="{BB962C8B-B14F-4D97-AF65-F5344CB8AC3E}">
         <p14:creationId xmlns:p14="http://schemas.microsoft.com/office/powerpoint/2010/main" val="2619220902"/>
+      </p:ext>
+    </p:extLst>
+  </p:cSld>
+  <p:clrMapOvr>
+    <a:masterClrMapping/>
+  </p:clrMapOvr>
+</p:sld>
+</file>
+
+<file path=ppt/slides/slide2.xml><?xml version="1.0" encoding="utf-8"?>
+<p:sld xmlns:a="http://schemas.openxmlformats.org/drawingml/2006/main" xmlns:r="http://schemas.openxmlformats.org/officeDocument/2006/relationships" xmlns:p="http://schemas.openxmlformats.org/presentationml/2006/main">
+  <p:cSld>
+    <p:spTree>
+      <p:nvGrpSpPr>
+        <p:cNvPr id="1" name=""/>
+        <p:cNvGrpSpPr/>
+        <p:nvPr/>
+      </p:nvGrpSpPr>
+      <p:grpSpPr>
+        <a:xfrm>
+          <a:off x="0" y="0"/>
+          <a:ext cx="0" cy="0"/>
+          <a:chOff x="0" y="0"/>
+          <a:chExt cx="0" cy="0"/>
+        </a:xfrm>
+      </p:grpSpPr>
+      <p:sp>
+        <p:nvSpPr>
+          <p:cNvPr id="2" name="Titel 1">
+            <a:extLst>
+              <a:ext uri="{FF2B5EF4-FFF2-40B4-BE49-F238E27FC236}">
+                <a16:creationId xmlns:a16="http://schemas.microsoft.com/office/drawing/2014/main" id="{90258236-5858-64A2-6F1D-648EA7886F22}"/>
+              </a:ext>
+            </a:extLst>
+          </p:cNvPr>
+          <p:cNvSpPr>
+            <a:spLocks noGrp="1"/>
+          </p:cNvSpPr>
+          <p:nvPr>
+            <p:ph type="ctrTitle"/>
+          </p:nvPr>
+        </p:nvSpPr>
+        <p:spPr>
+          <a:xfrm>
+            <a:off x="0" y="0"/>
+            <a:ext cx="12191999" cy="6858000"/>
+          </a:xfrm>
+          <a:solidFill>
+            <a:srgbClr val="0E0047"/>
+          </a:solidFill>
+          <a:ln w="57150">
+            <a:solidFill>
+              <a:srgbClr val="FF0000"/>
+            </a:solidFill>
+          </a:ln>
+        </p:spPr>
+        <p:txBody>
+          <a:bodyPr>
+            <a:normAutofit/>
+          </a:bodyPr>
+          <a:lstStyle/>
+          <a:p>
+            <a:r>
+              <a:rPr lang="de-DE" sz="18000" b="1" dirty="0">
+                <a:solidFill>
+                  <a:srgbClr val="FF0000"/>
+                </a:solidFill>
+                <a:latin typeface="Biome" panose="020B0604020202020204" pitchFamily="34" charset="0"/>
+                <a:cs typeface="Biome" panose="020B0604020202020204" pitchFamily="34" charset="0"/>
+              </a:rPr>
+              <a:t>POSE FIX</a:t>
+            </a:r>
+          </a:p>
+        </p:txBody>
+      </p:sp>
+      <p:pic>
+        <p:nvPicPr>
+          <p:cNvPr id="7" name="Grafik 6" descr="Ein Bild, das Karminrot, Silhouette enthält.&#10;&#10;Automatisch generierte Beschreibung">
+            <a:extLst>
+              <a:ext uri="{FF2B5EF4-FFF2-40B4-BE49-F238E27FC236}">
+                <a16:creationId xmlns:a16="http://schemas.microsoft.com/office/drawing/2014/main" id="{1E93E022-8F9B-47F5-C757-E0A83A088892}"/>
+              </a:ext>
+            </a:extLst>
+          </p:cNvPr>
+          <p:cNvPicPr>
+            <a:picLocks noChangeAspect="1"/>
+          </p:cNvPicPr>
+          <p:nvPr/>
+        </p:nvPicPr>
+        <p:blipFill>
+          <a:blip r:embed="rId2"/>
+          <a:stretch>
+            <a:fillRect/>
+          </a:stretch>
+        </p:blipFill>
+        <p:spPr>
+          <a:xfrm>
+            <a:off x="3588325" y="651162"/>
+            <a:ext cx="6858000" cy="6858000"/>
+          </a:xfrm>
+          <a:prstGeom prst="rect">
+            <a:avLst/>
+          </a:prstGeom>
+        </p:spPr>
+      </p:pic>
+    </p:spTree>
+    <p:extLst>
+      <p:ext uri="{BB962C8B-B14F-4D97-AF65-F5344CB8AC3E}">
+        <p14:creationId xmlns:p14="http://schemas.microsoft.com/office/powerpoint/2010/main" val="2124784099"/>
+      </p:ext>
+    </p:extLst>
+  </p:cSld>
+  <p:clrMapOvr>
+    <a:masterClrMapping/>
+  </p:clrMapOvr>
+</p:sld>
+</file>
+
+<file path=ppt/slides/slide3.xml><?xml version="1.0" encoding="utf-8"?>
+<p:sld xmlns:a="http://schemas.openxmlformats.org/drawingml/2006/main" xmlns:r="http://schemas.openxmlformats.org/officeDocument/2006/relationships" xmlns:p="http://schemas.openxmlformats.org/presentationml/2006/main">
+  <p:cSld>
+    <p:spTree>
+      <p:nvGrpSpPr>
+        <p:cNvPr id="1" name=""/>
+        <p:cNvGrpSpPr/>
+        <p:nvPr/>
+      </p:nvGrpSpPr>
+      <p:grpSpPr>
+        <a:xfrm>
+          <a:off x="0" y="0"/>
+          <a:ext cx="0" cy="0"/>
+          <a:chOff x="0" y="0"/>
+          <a:chExt cx="0" cy="0"/>
+        </a:xfrm>
+      </p:grpSpPr>
+      <p:sp>
+        <p:nvSpPr>
+          <p:cNvPr id="2" name="Titel 1">
+            <a:extLst>
+              <a:ext uri="{FF2B5EF4-FFF2-40B4-BE49-F238E27FC236}">
+                <a16:creationId xmlns:a16="http://schemas.microsoft.com/office/drawing/2014/main" id="{90258236-5858-64A2-6F1D-648EA7886F22}"/>
+              </a:ext>
+            </a:extLst>
+          </p:cNvPr>
+          <p:cNvSpPr>
+            <a:spLocks noGrp="1"/>
+          </p:cNvSpPr>
+          <p:nvPr>
+            <p:ph type="ctrTitle"/>
+          </p:nvPr>
+        </p:nvSpPr>
+        <p:spPr>
+          <a:xfrm>
+            <a:off x="0" y="0"/>
+            <a:ext cx="12191999" cy="6858000"/>
+          </a:xfrm>
+          <a:noFill/>
+          <a:ln w="104775">
+            <a:noFill/>
+          </a:ln>
+        </p:spPr>
+        <p:txBody>
+          <a:bodyPr>
+            <a:normAutofit/>
+          </a:bodyPr>
+          <a:lstStyle/>
+          <a:p>
+            <a:r>
+              <a:rPr lang="de-DE" sz="18000" b="1" dirty="0">
+                <a:solidFill>
+                  <a:srgbClr val="FF0000"/>
+                </a:solidFill>
+                <a:latin typeface="Biome" panose="020B0604020202020204" pitchFamily="34" charset="0"/>
+                <a:cs typeface="Biome" panose="020B0604020202020204" pitchFamily="34" charset="0"/>
+              </a:rPr>
+              <a:t>POSEFIX</a:t>
+            </a:r>
+            <a:r>
+              <a:rPr lang="de-DE" sz="18000" b="1" dirty="0">
+                <a:solidFill>
+                  <a:schemeClr val="bg1"/>
+                </a:solidFill>
+                <a:latin typeface="Biome" panose="020B0604020202020204" pitchFamily="34" charset="0"/>
+                <a:cs typeface="Biome" panose="020B0604020202020204" pitchFamily="34" charset="0"/>
+              </a:rPr>
+              <a:t>I</a:t>
+            </a:r>
+          </a:p>
+        </p:txBody>
+      </p:sp>
+      <p:pic>
+        <p:nvPicPr>
+          <p:cNvPr id="7" name="Grafik 6" descr="Ein Bild, das Karminrot, Silhouette enthält.&#10;&#10;Automatisch generierte Beschreibung">
+            <a:extLst>
+              <a:ext uri="{FF2B5EF4-FFF2-40B4-BE49-F238E27FC236}">
+                <a16:creationId xmlns:a16="http://schemas.microsoft.com/office/drawing/2014/main" id="{1E93E022-8F9B-47F5-C757-E0A83A088892}"/>
+              </a:ext>
+            </a:extLst>
+          </p:cNvPr>
+          <p:cNvPicPr>
+            <a:picLocks noChangeAspect="1"/>
+          </p:cNvPicPr>
+          <p:nvPr/>
+        </p:nvPicPr>
+        <p:blipFill>
+          <a:blip r:embed="rId3"/>
+          <a:stretch>
+            <a:fillRect/>
+          </a:stretch>
+        </p:blipFill>
+        <p:spPr>
+          <a:xfrm>
+            <a:off x="7148944" y="623453"/>
+            <a:ext cx="6858000" cy="6858000"/>
+          </a:xfrm>
+          <a:prstGeom prst="rect">
+            <a:avLst/>
+          </a:prstGeom>
+        </p:spPr>
+      </p:pic>
+    </p:spTree>
+    <p:extLst>
+      <p:ext uri="{BB962C8B-B14F-4D97-AF65-F5344CB8AC3E}">
+        <p14:creationId xmlns:p14="http://schemas.microsoft.com/office/powerpoint/2010/main" val="1380562448"/>
+      </p:ext>
+    </p:extLst>
+  </p:cSld>
+  <p:clrMapOvr>
+    <a:masterClrMapping/>
+  </p:clrMapOvr>
+</p:sld>
+</file>
+
+<file path=ppt/slides/slide4.xml><?xml version="1.0" encoding="utf-8"?>
+<p:sld xmlns:a="http://schemas.openxmlformats.org/drawingml/2006/main" xmlns:r="http://schemas.openxmlformats.org/officeDocument/2006/relationships" xmlns:p="http://schemas.openxmlformats.org/presentationml/2006/main">
+  <p:cSld>
+    <p:spTree>
+      <p:nvGrpSpPr>
+        <p:cNvPr id="1" name=""/>
+        <p:cNvGrpSpPr/>
+        <p:nvPr/>
+      </p:nvGrpSpPr>
+      <p:grpSpPr>
+        <a:xfrm>
+          <a:off x="0" y="0"/>
+          <a:ext cx="0" cy="0"/>
+          <a:chOff x="0" y="0"/>
+          <a:chExt cx="0" cy="0"/>
+        </a:xfrm>
+      </p:grpSpPr>
+      <p:sp>
+        <p:nvSpPr>
+          <p:cNvPr id="3" name="Titel 1">
+            <a:extLst>
+              <a:ext uri="{FF2B5EF4-FFF2-40B4-BE49-F238E27FC236}">
+                <a16:creationId xmlns:a16="http://schemas.microsoft.com/office/drawing/2014/main" id="{F4110FD1-95D2-75CD-1D51-5AAAB6CE2545}"/>
+              </a:ext>
+            </a:extLst>
+          </p:cNvPr>
+          <p:cNvSpPr txBox="1">
+            <a:spLocks/>
+          </p:cNvSpPr>
+          <p:nvPr/>
+        </p:nvSpPr>
+        <p:spPr>
+          <a:xfrm>
+            <a:off x="4" y="0"/>
+            <a:ext cx="12191999" cy="6858000"/>
+          </a:xfrm>
+          <a:prstGeom prst="rect">
+            <a:avLst/>
+          </a:prstGeom>
+          <a:solidFill>
+            <a:srgbClr val="0E0047"/>
+          </a:solidFill>
+          <a:ln w="104775">
+            <a:solidFill>
+              <a:srgbClr val="FF0000"/>
+            </a:solidFill>
+          </a:ln>
+        </p:spPr>
+        <p:txBody>
+          <a:bodyPr vert="horz" lIns="91440" tIns="45720" rIns="91440" bIns="45720" rtlCol="0" anchor="b">
+            <a:normAutofit/>
+          </a:bodyPr>
+          <a:lstStyle>
+            <a:lvl1pPr algn="ctr" defTabSz="914400" rtl="0" eaLnBrk="1" latinLnBrk="0" hangingPunct="1">
+              <a:lnSpc>
+                <a:spcPct val="90000"/>
+              </a:lnSpc>
+              <a:spcBef>
+                <a:spcPct val="0"/>
+              </a:spcBef>
+              <a:buNone/>
+              <a:defRPr sz="6000" kern="1200">
+                <a:solidFill>
+                  <a:schemeClr val="tx1"/>
+                </a:solidFill>
+                <a:latin typeface="+mj-lt"/>
+                <a:ea typeface="+mj-ea"/>
+                <a:cs typeface="+mj-cs"/>
+              </a:defRPr>
+            </a:lvl1pPr>
+          </a:lstStyle>
+          <a:p>
+            <a:r>
+              <a:rPr lang="de-DE" sz="18000" b="1" dirty="0">
+                <a:solidFill>
+                  <a:srgbClr val="FF0000"/>
+                </a:solidFill>
+                <a:latin typeface="Biome" panose="020B0604020202020204" pitchFamily="34" charset="0"/>
+                <a:cs typeface="Biome" panose="020B0604020202020204" pitchFamily="34" charset="0"/>
+              </a:rPr>
+              <a:t>POSEFIX</a:t>
+            </a:r>
+          </a:p>
+        </p:txBody>
+      </p:sp>
+      <p:sp>
+        <p:nvSpPr>
+          <p:cNvPr id="2" name="Titel 1">
+            <a:extLst>
+              <a:ext uri="{FF2B5EF4-FFF2-40B4-BE49-F238E27FC236}">
+                <a16:creationId xmlns:a16="http://schemas.microsoft.com/office/drawing/2014/main" id="{90258236-5858-64A2-6F1D-648EA7886F22}"/>
+              </a:ext>
+            </a:extLst>
+          </p:cNvPr>
+          <p:cNvSpPr>
+            <a:spLocks noGrp="1"/>
+          </p:cNvSpPr>
+          <p:nvPr>
+            <p:ph type="ctrTitle"/>
+          </p:nvPr>
+        </p:nvSpPr>
+        <p:spPr>
+          <a:xfrm>
+            <a:off x="0" y="0"/>
+            <a:ext cx="12191999" cy="6858000"/>
+          </a:xfrm>
+          <a:solidFill>
+            <a:schemeClr val="bg1"/>
+          </a:solidFill>
+          <a:ln w="104775">
+            <a:noFill/>
+          </a:ln>
+        </p:spPr>
+        <p:txBody>
+          <a:bodyPr>
+            <a:normAutofit/>
+          </a:bodyPr>
+          <a:lstStyle/>
+          <a:p>
+            <a:r>
+              <a:rPr lang="de-DE" sz="18000" b="1" dirty="0">
+                <a:solidFill>
+                  <a:srgbClr val="FF0000"/>
+                </a:solidFill>
+                <a:latin typeface="Biome" panose="020B0604020202020204" pitchFamily="34" charset="0"/>
+                <a:cs typeface="Biome" panose="020B0604020202020204" pitchFamily="34" charset="0"/>
+              </a:rPr>
+              <a:t>POSEFIX</a:t>
+            </a:r>
+            <a:r>
+              <a:rPr lang="de-DE" sz="18000" b="1" dirty="0">
+                <a:solidFill>
+                  <a:schemeClr val="bg1"/>
+                </a:solidFill>
+                <a:latin typeface="Biome" panose="020B0604020202020204" pitchFamily="34" charset="0"/>
+                <a:cs typeface="Biome" panose="020B0604020202020204" pitchFamily="34" charset="0"/>
+              </a:rPr>
+              <a:t>I</a:t>
+            </a:r>
+          </a:p>
+        </p:txBody>
+      </p:sp>
+      <p:pic>
+        <p:nvPicPr>
+          <p:cNvPr id="7" name="Grafik 6" descr="Ein Bild, das Karminrot, Silhouette enthält.&#10;&#10;Automatisch generierte Beschreibung">
+            <a:extLst>
+              <a:ext uri="{FF2B5EF4-FFF2-40B4-BE49-F238E27FC236}">
+                <a16:creationId xmlns:a16="http://schemas.microsoft.com/office/drawing/2014/main" id="{1E93E022-8F9B-47F5-C757-E0A83A088892}"/>
+              </a:ext>
+            </a:extLst>
+          </p:cNvPr>
+          <p:cNvPicPr>
+            <a:picLocks noChangeAspect="1"/>
+          </p:cNvPicPr>
+          <p:nvPr/>
+        </p:nvPicPr>
+        <p:blipFill>
+          <a:blip r:embed="rId3"/>
+          <a:stretch>
+            <a:fillRect/>
+          </a:stretch>
+        </p:blipFill>
+        <p:spPr>
+          <a:xfrm>
+            <a:off x="7148944" y="623453"/>
+            <a:ext cx="6858000" cy="6858000"/>
+          </a:xfrm>
+          <a:prstGeom prst="rect">
+            <a:avLst/>
+          </a:prstGeom>
+        </p:spPr>
+      </p:pic>
+    </p:spTree>
+    <p:extLst>
+      <p:ext uri="{BB962C8B-B14F-4D97-AF65-F5344CB8AC3E}">
+        <p14:creationId xmlns:p14="http://schemas.microsoft.com/office/powerpoint/2010/main" val="3461760285"/>
+      </p:ext>
+    </p:extLst>
+  </p:cSld>
+  <p:clrMapOvr>
+    <a:masterClrMapping/>
+  </p:clrMapOvr>
+</p:sld>
+</file>
+
+<file path=ppt/slides/slide5.xml><?xml version="1.0" encoding="utf-8"?>
+<p:sld xmlns:a="http://schemas.openxmlformats.org/drawingml/2006/main" xmlns:r="http://schemas.openxmlformats.org/officeDocument/2006/relationships" xmlns:p="http://schemas.openxmlformats.org/presentationml/2006/main">
+  <p:cSld>
+    <p:spTree>
+      <p:nvGrpSpPr>
+        <p:cNvPr id="1" name=""/>
+        <p:cNvGrpSpPr/>
+        <p:nvPr/>
+      </p:nvGrpSpPr>
+      <p:grpSpPr>
+        <a:xfrm>
+          <a:off x="0" y="0"/>
+          <a:ext cx="0" cy="0"/>
+          <a:chOff x="0" y="0"/>
+          <a:chExt cx="0" cy="0"/>
+        </a:xfrm>
+      </p:grpSpPr>
+      <p:sp>
+        <p:nvSpPr>
+          <p:cNvPr id="3" name="Titel 1">
+            <a:extLst>
+              <a:ext uri="{FF2B5EF4-FFF2-40B4-BE49-F238E27FC236}">
+                <a16:creationId xmlns:a16="http://schemas.microsoft.com/office/drawing/2014/main" id="{F4110FD1-95D2-75CD-1D51-5AAAB6CE2545}"/>
+              </a:ext>
+            </a:extLst>
+          </p:cNvPr>
+          <p:cNvSpPr txBox="1">
+            <a:spLocks/>
+          </p:cNvSpPr>
+          <p:nvPr/>
+        </p:nvSpPr>
+        <p:spPr>
+          <a:xfrm>
+            <a:off x="4" y="0"/>
+            <a:ext cx="12191999" cy="6858000"/>
+          </a:xfrm>
+          <a:prstGeom prst="rect">
+            <a:avLst/>
+          </a:prstGeom>
+          <a:solidFill>
+            <a:srgbClr val="0E0047"/>
+          </a:solidFill>
+          <a:ln w="104775">
+            <a:solidFill>
+              <a:srgbClr val="FF0000"/>
+            </a:solidFill>
+          </a:ln>
+        </p:spPr>
+        <p:txBody>
+          <a:bodyPr vert="horz" lIns="91440" tIns="45720" rIns="91440" bIns="45720" rtlCol="0" anchor="b">
+            <a:normAutofit/>
+          </a:bodyPr>
+          <a:lstStyle>
+            <a:lvl1pPr algn="ctr" defTabSz="914400" rtl="0" eaLnBrk="1" latinLnBrk="0" hangingPunct="1">
+              <a:lnSpc>
+                <a:spcPct val="90000"/>
+              </a:lnSpc>
+              <a:spcBef>
+                <a:spcPct val="0"/>
+              </a:spcBef>
+              <a:buNone/>
+              <a:defRPr sz="6000" kern="1200">
+                <a:solidFill>
+                  <a:schemeClr val="tx1"/>
+                </a:solidFill>
+                <a:latin typeface="+mj-lt"/>
+                <a:ea typeface="+mj-ea"/>
+                <a:cs typeface="+mj-cs"/>
+              </a:defRPr>
+            </a:lvl1pPr>
+          </a:lstStyle>
+          <a:p>
+            <a:r>
+              <a:rPr lang="de-DE" sz="18000" b="1" dirty="0">
+                <a:solidFill>
+                  <a:srgbClr val="FF0000"/>
+                </a:solidFill>
+                <a:latin typeface="Biome" panose="020B0604020202020204" pitchFamily="34" charset="0"/>
+                <a:cs typeface="Biome" panose="020B0604020202020204" pitchFamily="34" charset="0"/>
+              </a:rPr>
+              <a:t>POSEFIX</a:t>
+            </a:r>
+          </a:p>
+        </p:txBody>
+      </p:sp>
+      <p:sp>
+        <p:nvSpPr>
+          <p:cNvPr id="2" name="Titel 1">
+            <a:extLst>
+              <a:ext uri="{FF2B5EF4-FFF2-40B4-BE49-F238E27FC236}">
+                <a16:creationId xmlns:a16="http://schemas.microsoft.com/office/drawing/2014/main" id="{90258236-5858-64A2-6F1D-648EA7886F22}"/>
+              </a:ext>
+            </a:extLst>
+          </p:cNvPr>
+          <p:cNvSpPr>
+            <a:spLocks noGrp="1"/>
+          </p:cNvSpPr>
+          <p:nvPr>
+            <p:ph type="ctrTitle"/>
+          </p:nvPr>
+        </p:nvSpPr>
+        <p:spPr>
+          <a:xfrm>
+            <a:off x="0" y="0"/>
+            <a:ext cx="12191999" cy="6858000"/>
+          </a:xfrm>
+          <a:solidFill>
+            <a:schemeClr val="bg1"/>
+          </a:solidFill>
+          <a:ln w="104775">
+            <a:noFill/>
+          </a:ln>
+        </p:spPr>
+        <p:txBody>
+          <a:bodyPr>
+            <a:normAutofit/>
+          </a:bodyPr>
+          <a:lstStyle/>
+          <a:p>
+            <a:r>
+              <a:rPr lang="de-DE" sz="18000" b="1" dirty="0">
+                <a:solidFill>
+                  <a:srgbClr val="FF0000"/>
+                </a:solidFill>
+                <a:latin typeface="Biome" panose="020B0604020202020204" pitchFamily="34" charset="0"/>
+                <a:cs typeface="Biome" panose="020B0604020202020204" pitchFamily="34" charset="0"/>
+              </a:rPr>
+              <a:t>POSEFIX</a:t>
+            </a:r>
+            <a:r>
+              <a:rPr lang="de-DE" sz="18000" b="1" dirty="0">
+                <a:solidFill>
+                  <a:schemeClr val="bg1"/>
+                </a:solidFill>
+                <a:latin typeface="Biome" panose="020B0604020202020204" pitchFamily="34" charset="0"/>
+                <a:cs typeface="Biome" panose="020B0604020202020204" pitchFamily="34" charset="0"/>
+              </a:rPr>
+              <a:t>I</a:t>
+            </a:r>
+          </a:p>
+        </p:txBody>
+      </p:sp>
+      <p:pic>
+        <p:nvPicPr>
+          <p:cNvPr id="6" name="Grafik 5">
+            <a:extLst>
+              <a:ext uri="{FF2B5EF4-FFF2-40B4-BE49-F238E27FC236}">
+                <a16:creationId xmlns:a16="http://schemas.microsoft.com/office/drawing/2014/main" id="{D0AEEC67-6A20-2914-01E3-C91D3B5C2B95}"/>
+              </a:ext>
+            </a:extLst>
+          </p:cNvPr>
+          <p:cNvPicPr>
+            <a:picLocks noChangeAspect="1"/>
+          </p:cNvPicPr>
+          <p:nvPr/>
+        </p:nvPicPr>
+        <p:blipFill>
+          <a:blip r:embed="rId3"/>
+          <a:stretch>
+            <a:fillRect/>
+          </a:stretch>
+        </p:blipFill>
+        <p:spPr>
+          <a:xfrm>
+            <a:off x="-412751" y="138546"/>
+            <a:ext cx="4807527" cy="4807527"/>
+          </a:xfrm>
+          <a:prstGeom prst="rect">
+            <a:avLst/>
+          </a:prstGeom>
+        </p:spPr>
+      </p:pic>
+    </p:spTree>
+    <p:extLst>
+      <p:ext uri="{BB962C8B-B14F-4D97-AF65-F5344CB8AC3E}">
+        <p14:creationId xmlns:p14="http://schemas.microsoft.com/office/powerpoint/2010/main" val="2749780499"/>
+      </p:ext>
+    </p:extLst>
+  </p:cSld>
+  <p:clrMapOvr>
+    <a:masterClrMapping/>
+  </p:clrMapOvr>
+</p:sld>
+</file>
+
+<file path=ppt/slides/slide6.xml><?xml version="1.0" encoding="utf-8"?>
+<p:sld xmlns:a="http://schemas.openxmlformats.org/drawingml/2006/main" xmlns:r="http://schemas.openxmlformats.org/officeDocument/2006/relationships" xmlns:p="http://schemas.openxmlformats.org/presentationml/2006/main" showMasterSp="0">
+  <p:cSld>
+    <p:spTree>
+      <p:nvGrpSpPr>
+        <p:cNvPr id="1" name=""/>
+        <p:cNvGrpSpPr/>
+        <p:nvPr/>
+      </p:nvGrpSpPr>
+      <p:grpSpPr>
+        <a:xfrm>
+          <a:off x="0" y="0"/>
+          <a:ext cx="0" cy="0"/>
+          <a:chOff x="0" y="0"/>
+          <a:chExt cx="0" cy="0"/>
+        </a:xfrm>
+      </p:grpSpPr>
+      <p:sp>
+        <p:nvSpPr>
+          <p:cNvPr id="2" name="Titel 1">
+            <a:extLst>
+              <a:ext uri="{FF2B5EF4-FFF2-40B4-BE49-F238E27FC236}">
+                <a16:creationId xmlns:a16="http://schemas.microsoft.com/office/drawing/2014/main" id="{90258236-5858-64A2-6F1D-648EA7886F22}"/>
+              </a:ext>
+            </a:extLst>
+          </p:cNvPr>
+          <p:cNvSpPr>
+            <a:spLocks noGrp="1"/>
+          </p:cNvSpPr>
+          <p:nvPr>
+            <p:ph type="ctrTitle"/>
+          </p:nvPr>
+        </p:nvSpPr>
+        <p:spPr>
+          <a:xfrm>
+            <a:off x="0" y="0"/>
+            <a:ext cx="12191999" cy="6858000"/>
+          </a:xfrm>
+          <a:solidFill>
+            <a:schemeClr val="bg1"/>
+          </a:solidFill>
+          <a:ln w="57150">
+            <a:solidFill>
+              <a:srgbClr val="FF0000"/>
+            </a:solidFill>
+          </a:ln>
+        </p:spPr>
+        <p:txBody>
+          <a:bodyPr anchor="ctr">
+            <a:normAutofit/>
+          </a:bodyPr>
+          <a:lstStyle/>
+          <a:p>
+            <a:r>
+              <a:rPr lang="de-DE" sz="17000" b="1" dirty="0">
+                <a:solidFill>
+                  <a:srgbClr val="FF0000"/>
+                </a:solidFill>
+                <a:latin typeface="Biome" panose="020B0604020202020204" pitchFamily="34" charset="0"/>
+                <a:cs typeface="Biome" panose="020B0604020202020204" pitchFamily="34" charset="0"/>
+              </a:rPr>
+              <a:t>POSEFIX</a:t>
+            </a:r>
+            <a:endParaRPr lang="de-DE" sz="18000" b="1" dirty="0">
+              <a:solidFill>
+                <a:srgbClr val="FF0000"/>
+              </a:solidFill>
+              <a:latin typeface="Biome" panose="020B0604020202020204" pitchFamily="34" charset="0"/>
+              <a:cs typeface="Biome" panose="020B0604020202020204" pitchFamily="34" charset="0"/>
+            </a:endParaRPr>
+          </a:p>
+        </p:txBody>
+      </p:sp>
+      <p:pic>
+        <p:nvPicPr>
+          <p:cNvPr id="4" name="Grafik 3" descr="Ein Bild, das Stuhl, Design, Mobiliar enthält.&#10;&#10;Automatisch generierte Beschreibung">
+            <a:extLst>
+              <a:ext uri="{FF2B5EF4-FFF2-40B4-BE49-F238E27FC236}">
+                <a16:creationId xmlns:a16="http://schemas.microsoft.com/office/drawing/2014/main" id="{EB43AE25-30B9-89EA-895F-2E6CEE4FEDBC}"/>
+              </a:ext>
+            </a:extLst>
+          </p:cNvPr>
+          <p:cNvPicPr>
+            <a:picLocks noChangeAspect="1"/>
+          </p:cNvPicPr>
+          <p:nvPr/>
+        </p:nvPicPr>
+        <p:blipFill>
+          <a:blip r:embed="rId3"/>
+          <a:stretch>
+            <a:fillRect/>
+          </a:stretch>
+        </p:blipFill>
+        <p:spPr>
+          <a:xfrm>
+            <a:off x="167431" y="2637857"/>
+            <a:ext cx="2392796" cy="3593422"/>
+          </a:xfrm>
+          <a:prstGeom prst="rect">
+            <a:avLst/>
+          </a:prstGeom>
+        </p:spPr>
+      </p:pic>
+    </p:spTree>
+    <p:extLst>
+      <p:ext uri="{BB962C8B-B14F-4D97-AF65-F5344CB8AC3E}">
+        <p14:creationId xmlns:p14="http://schemas.microsoft.com/office/powerpoint/2010/main" val="2043243625"/>
+      </p:ext>
+    </p:extLst>
+  </p:cSld>
+  <p:clrMapOvr>
+    <a:masterClrMapping/>
+  </p:clrMapOvr>
+</p:sld>
+</file>
+
+<file path=ppt/slides/slide7.xml><?xml version="1.0" encoding="utf-8"?>
+<p:sld xmlns:a="http://schemas.openxmlformats.org/drawingml/2006/main" xmlns:r="http://schemas.openxmlformats.org/officeDocument/2006/relationships" xmlns:p="http://schemas.openxmlformats.org/presentationml/2006/main">
+  <p:cSld>
+    <p:spTree>
+      <p:nvGrpSpPr>
+        <p:cNvPr id="1" name=""/>
+        <p:cNvGrpSpPr/>
+        <p:nvPr/>
+      </p:nvGrpSpPr>
+      <p:grpSpPr>
+        <a:xfrm>
+          <a:off x="0" y="0"/>
+          <a:ext cx="0" cy="0"/>
+          <a:chOff x="0" y="0"/>
+          <a:chExt cx="0" cy="0"/>
+        </a:xfrm>
+      </p:grpSpPr>
+      <p:sp>
+        <p:nvSpPr>
+          <p:cNvPr id="2" name="Titel 1">
+            <a:extLst>
+              <a:ext uri="{FF2B5EF4-FFF2-40B4-BE49-F238E27FC236}">
+                <a16:creationId xmlns:a16="http://schemas.microsoft.com/office/drawing/2014/main" id="{90258236-5858-64A2-6F1D-648EA7886F22}"/>
+              </a:ext>
+            </a:extLst>
+          </p:cNvPr>
+          <p:cNvSpPr>
+            <a:spLocks noGrp="1"/>
+          </p:cNvSpPr>
+          <p:nvPr>
+            <p:ph type="ctrTitle"/>
+          </p:nvPr>
+        </p:nvSpPr>
+        <p:spPr>
+          <a:xfrm>
+            <a:off x="0" y="0"/>
+            <a:ext cx="12191999" cy="6858000"/>
+          </a:xfrm>
+          <a:solidFill>
+            <a:schemeClr val="bg1"/>
+          </a:solidFill>
+          <a:ln w="104775">
+            <a:noFill/>
+          </a:ln>
+        </p:spPr>
+        <p:txBody>
+          <a:bodyPr anchor="ctr">
+            <a:normAutofit/>
+          </a:bodyPr>
+          <a:lstStyle/>
+          <a:p>
+            <a:pPr algn="l"/>
+            <a:r>
+              <a:rPr lang="de-DE" sz="15000" b="1" dirty="0">
+                <a:solidFill>
+                  <a:srgbClr val="FF0000"/>
+                </a:solidFill>
+                <a:latin typeface="Biome" panose="020B0604020202020204" pitchFamily="34" charset="0"/>
+                <a:cs typeface="Biome" panose="020B0604020202020204" pitchFamily="34" charset="0"/>
+              </a:rPr>
+              <a:t>       POSEFIX</a:t>
+            </a:r>
+            <a:endParaRPr lang="de-DE" sz="18000" b="1" dirty="0">
+              <a:solidFill>
+                <a:srgbClr val="FF0000"/>
+              </a:solidFill>
+              <a:latin typeface="Biome" panose="020B0604020202020204" pitchFamily="34" charset="0"/>
+              <a:cs typeface="Biome" panose="020B0604020202020204" pitchFamily="34" charset="0"/>
+            </a:endParaRPr>
+          </a:p>
+        </p:txBody>
+      </p:sp>
+      <p:pic>
+        <p:nvPicPr>
+          <p:cNvPr id="4" name="Grafik 3" descr="Ein Bild, das Stuhl, Design, Mobiliar enthält.&#10;&#10;Automatisch generierte Beschreibung">
+            <a:extLst>
+              <a:ext uri="{FF2B5EF4-FFF2-40B4-BE49-F238E27FC236}">
+                <a16:creationId xmlns:a16="http://schemas.microsoft.com/office/drawing/2014/main" id="{EB43AE25-30B9-89EA-895F-2E6CEE4FEDBC}"/>
+              </a:ext>
+            </a:extLst>
+          </p:cNvPr>
+          <p:cNvPicPr>
+            <a:picLocks noChangeAspect="1"/>
+          </p:cNvPicPr>
+          <p:nvPr/>
+        </p:nvPicPr>
+        <p:blipFill>
+          <a:blip r:embed="rId3"/>
+          <a:stretch>
+            <a:fillRect/>
+          </a:stretch>
+        </p:blipFill>
+        <p:spPr>
+          <a:xfrm>
+            <a:off x="1050298" y="1187431"/>
+            <a:ext cx="2392796" cy="3593422"/>
+          </a:xfrm>
+          <a:prstGeom prst="rect">
+            <a:avLst/>
+          </a:prstGeom>
+        </p:spPr>
+      </p:pic>
+    </p:spTree>
+    <p:extLst>
+      <p:ext uri="{BB962C8B-B14F-4D97-AF65-F5344CB8AC3E}">
+        <p14:creationId xmlns:p14="http://schemas.microsoft.com/office/powerpoint/2010/main" val="1256475708"/>
+      </p:ext>
+    </p:extLst>
+  </p:cSld>
+  <p:clrMapOvr>
+    <a:masterClrMapping/>
+  </p:clrMapOvr>
+</p:sld>
+</file>
+
+<file path=ppt/slides/slide8.xml><?xml version="1.0" encoding="utf-8"?>
+<p:sld xmlns:a="http://schemas.openxmlformats.org/drawingml/2006/main" xmlns:r="http://schemas.openxmlformats.org/officeDocument/2006/relationships" xmlns:p="http://schemas.openxmlformats.org/presentationml/2006/main">
+  <p:cSld>
+    <p:spTree>
+      <p:nvGrpSpPr>
+        <p:cNvPr id="1" name=""/>
+        <p:cNvGrpSpPr/>
+        <p:nvPr/>
+      </p:nvGrpSpPr>
+      <p:grpSpPr>
+        <a:xfrm>
+          <a:off x="0" y="0"/>
+          <a:ext cx="0" cy="0"/>
+          <a:chOff x="0" y="0"/>
+          <a:chExt cx="0" cy="0"/>
+        </a:xfrm>
+      </p:grpSpPr>
+      <p:sp>
+        <p:nvSpPr>
+          <p:cNvPr id="2" name="Titel 1">
+            <a:extLst>
+              <a:ext uri="{FF2B5EF4-FFF2-40B4-BE49-F238E27FC236}">
+                <a16:creationId xmlns:a16="http://schemas.microsoft.com/office/drawing/2014/main" id="{90258236-5858-64A2-6F1D-648EA7886F22}"/>
+              </a:ext>
+            </a:extLst>
+          </p:cNvPr>
+          <p:cNvSpPr>
+            <a:spLocks noGrp="1"/>
+          </p:cNvSpPr>
+          <p:nvPr>
+            <p:ph type="ctrTitle"/>
+          </p:nvPr>
+        </p:nvSpPr>
+        <p:spPr>
+          <a:xfrm>
+            <a:off x="0" y="0"/>
+            <a:ext cx="12191999" cy="6858000"/>
+          </a:xfrm>
+          <a:solidFill>
+            <a:schemeClr val="bg1"/>
+          </a:solidFill>
+          <a:ln w="104775">
+            <a:noFill/>
+          </a:ln>
+        </p:spPr>
+        <p:txBody>
+          <a:bodyPr anchor="ctr">
+            <a:normAutofit/>
+          </a:bodyPr>
+          <a:lstStyle/>
+          <a:p>
+            <a:pPr algn="l"/>
+            <a:r>
+              <a:rPr lang="de-DE" sz="15000" b="1">
+                <a:solidFill>
+                  <a:srgbClr val="FF0000"/>
+                </a:solidFill>
+                <a:latin typeface="Biome" panose="020B0604020202020204" pitchFamily="34" charset="0"/>
+                <a:cs typeface="Biome" panose="020B0604020202020204" pitchFamily="34" charset="0"/>
+              </a:rPr>
+              <a:t>       POSEFIX</a:t>
+            </a:r>
+            <a:endParaRPr lang="de-DE" sz="18000" b="1" dirty="0">
+              <a:solidFill>
+                <a:srgbClr val="FF0000"/>
+              </a:solidFill>
+              <a:latin typeface="Biome" panose="020B0604020202020204" pitchFamily="34" charset="0"/>
+              <a:cs typeface="Biome" panose="020B0604020202020204" pitchFamily="34" charset="0"/>
+            </a:endParaRPr>
+          </a:p>
+        </p:txBody>
+      </p:sp>
+      <p:pic>
+        <p:nvPicPr>
+          <p:cNvPr id="3" name="Grafik 2">
+            <a:extLst>
+              <a:ext uri="{FF2B5EF4-FFF2-40B4-BE49-F238E27FC236}">
+                <a16:creationId xmlns:a16="http://schemas.microsoft.com/office/drawing/2014/main" id="{90F2AD1D-7CC0-936C-2D18-EA484C074CF6}"/>
+              </a:ext>
+            </a:extLst>
+          </p:cNvPr>
+          <p:cNvPicPr>
+            <a:picLocks noChangeAspect="1"/>
+          </p:cNvPicPr>
+          <p:nvPr/>
+        </p:nvPicPr>
+        <p:blipFill>
+          <a:blip r:embed="rId3"/>
+          <a:stretch>
+            <a:fillRect/>
+          </a:stretch>
+        </p:blipFill>
+        <p:spPr>
+          <a:xfrm>
+            <a:off x="-412751" y="321540"/>
+            <a:ext cx="4624533" cy="4624533"/>
+          </a:xfrm>
+          <a:prstGeom prst="rect">
+            <a:avLst/>
+          </a:prstGeom>
+        </p:spPr>
+      </p:pic>
+    </p:spTree>
+    <p:extLst>
+      <p:ext uri="{BB962C8B-B14F-4D97-AF65-F5344CB8AC3E}">
+        <p14:creationId xmlns:p14="http://schemas.microsoft.com/office/powerpoint/2010/main" val="324883058"/>
+      </p:ext>
+    </p:extLst>
+  </p:cSld>
+  <p:clrMapOvr>
+    <a:masterClrMapping/>
+  </p:clrMapOvr>
+</p:sld>
+</file>
+
+<file path=ppt/slides/slide9.xml><?xml version="1.0" encoding="utf-8"?>
+<p:sld xmlns:a="http://schemas.openxmlformats.org/drawingml/2006/main" xmlns:r="http://schemas.openxmlformats.org/officeDocument/2006/relationships" xmlns:p="http://schemas.openxmlformats.org/presentationml/2006/main">
+  <p:cSld>
+    <p:spTree>
+      <p:nvGrpSpPr>
+        <p:cNvPr id="1" name=""/>
+        <p:cNvGrpSpPr/>
+        <p:nvPr/>
+      </p:nvGrpSpPr>
+      <p:grpSpPr>
+        <a:xfrm>
+          <a:off x="0" y="0"/>
+          <a:ext cx="0" cy="0"/>
+          <a:chOff x="0" y="0"/>
+          <a:chExt cx="0" cy="0"/>
+        </a:xfrm>
+      </p:grpSpPr>
+      <p:sp>
+        <p:nvSpPr>
+          <p:cNvPr id="2" name="Titel 1">
+            <a:extLst>
+              <a:ext uri="{FF2B5EF4-FFF2-40B4-BE49-F238E27FC236}">
+                <a16:creationId xmlns:a16="http://schemas.microsoft.com/office/drawing/2014/main" id="{90258236-5858-64A2-6F1D-648EA7886F22}"/>
+              </a:ext>
+            </a:extLst>
+          </p:cNvPr>
+          <p:cNvSpPr>
+            <a:spLocks noGrp="1"/>
+          </p:cNvSpPr>
+          <p:nvPr>
+            <p:ph type="ctrTitle"/>
+          </p:nvPr>
+        </p:nvSpPr>
+        <p:spPr>
+          <a:xfrm>
+            <a:off x="0" y="0"/>
+            <a:ext cx="12191999" cy="6858000"/>
+          </a:xfrm>
+          <a:solidFill>
+            <a:schemeClr val="tx1"/>
+          </a:solidFill>
+          <a:ln w="104775">
+            <a:solidFill>
+              <a:schemeClr val="bg1"/>
+            </a:solidFill>
+          </a:ln>
+        </p:spPr>
+        <p:txBody>
+          <a:bodyPr anchor="ctr">
+            <a:normAutofit/>
+          </a:bodyPr>
+          <a:lstStyle/>
+          <a:p>
+            <a:pPr algn="l"/>
+            <a:r>
+              <a:rPr lang="de-DE" sz="15000" b="1" dirty="0">
+                <a:solidFill>
+                  <a:srgbClr val="FF0000"/>
+                </a:solidFill>
+                <a:latin typeface="Biome" panose="020B0604020202020204" pitchFamily="34" charset="0"/>
+                <a:cs typeface="Biome" panose="020B0604020202020204" pitchFamily="34" charset="0"/>
+              </a:rPr>
+              <a:t>       </a:t>
+            </a:r>
+            <a:r>
+              <a:rPr lang="de-DE" sz="15000" b="1" dirty="0">
+                <a:solidFill>
+                  <a:schemeClr val="bg1"/>
+                </a:solidFill>
+                <a:latin typeface="Biome" panose="020B0604020202020204" pitchFamily="34" charset="0"/>
+                <a:cs typeface="Biome" panose="020B0604020202020204" pitchFamily="34" charset="0"/>
+              </a:rPr>
+              <a:t>POSEFIX</a:t>
+            </a:r>
+            <a:endParaRPr lang="de-DE" sz="18000" b="1" dirty="0">
+              <a:solidFill>
+                <a:schemeClr val="bg1"/>
+              </a:solidFill>
+              <a:latin typeface="Biome" panose="020B0604020202020204" pitchFamily="34" charset="0"/>
+              <a:cs typeface="Biome" panose="020B0604020202020204" pitchFamily="34" charset="0"/>
+            </a:endParaRPr>
+          </a:p>
+        </p:txBody>
+      </p:sp>
+      <p:pic>
+        <p:nvPicPr>
+          <p:cNvPr id="3" name="Grafik 2">
+            <a:extLst>
+              <a:ext uri="{FF2B5EF4-FFF2-40B4-BE49-F238E27FC236}">
+                <a16:creationId xmlns:a16="http://schemas.microsoft.com/office/drawing/2014/main" id="{90F2AD1D-7CC0-936C-2D18-EA484C074CF6}"/>
+              </a:ext>
+            </a:extLst>
+          </p:cNvPr>
+          <p:cNvPicPr>
+            <a:picLocks noChangeAspect="1"/>
+          </p:cNvPicPr>
+          <p:nvPr/>
+        </p:nvPicPr>
+        <p:blipFill>
+          <a:blip r:embed="rId3">
+            <a:alphaModFix amt="76000"/>
+            <a:extLst>
+              <a:ext uri="{BEBA8EAE-BF5A-486C-A8C5-ECC9F3942E4B}">
+                <a14:imgProps xmlns:a14="http://schemas.microsoft.com/office/drawing/2010/main">
+                  <a14:imgLayer r:embed="rId4">
+                    <a14:imgEffect>
+                      <a14:sharpenSoften amount="-50000"/>
+                    </a14:imgEffect>
+                    <a14:imgEffect>
+                      <a14:colorTemperature colorTemp="11500"/>
+                    </a14:imgEffect>
+                    <a14:imgEffect>
+                      <a14:saturation sat="400000"/>
+                    </a14:imgEffect>
+                    <a14:imgEffect>
+                      <a14:brightnessContrast bright="-4000" contrast="17000"/>
+                    </a14:imgEffect>
+                  </a14:imgLayer>
+                </a14:imgProps>
+              </a:ext>
+            </a:extLst>
+          </a:blip>
+          <a:stretch>
+            <a:fillRect/>
+          </a:stretch>
+        </p:blipFill>
+        <p:spPr>
+          <a:xfrm>
+            <a:off x="-2327564" y="-1759526"/>
+            <a:ext cx="12538363" cy="12538363"/>
+          </a:xfrm>
+          <a:prstGeom prst="rect">
+            <a:avLst/>
+          </a:prstGeom>
+          <a:effectLst>
+            <a:outerShdw blurRad="499858" dist="50800" dir="5400000" sx="45634" sy="45634" algn="ctr" rotWithShape="0">
+              <a:srgbClr val="000000">
+                <a:alpha val="0"/>
+              </a:srgbClr>
+            </a:outerShdw>
+          </a:effectLst>
+        </p:spPr>
+      </p:pic>
+    </p:spTree>
+    <p:extLst>
+      <p:ext uri="{BB962C8B-B14F-4D97-AF65-F5344CB8AC3E}">
+        <p14:creationId xmlns:p14="http://schemas.microsoft.com/office/powerpoint/2010/main" val="2819967148"/>
       </p:ext>
     </p:extLst>
   </p:cSld>

</xml_diff>